<commit_message>
chore: update old pptx
</commit_message>
<xml_diff>
--- a/docs/bemutato1.pptx
+++ b/docs/bemutato1.pptx
@@ -6826,7 +6826,15 @@
             </a:pPr>
             <a:r>
               <a:rPr lang="en"/>
-              <a:t>Projekt Bemutató 1.</a:t>
+              <a:t>Proje</a:t>
+            </a:r>
+            <a:r>
+              <a:rPr lang="en"/>
+              <a:t>kt Bemutató </a:t>
+            </a:r>
+            <a:r>
+              <a:rPr lang="en"/>
+              <a:t>1.</a:t>
             </a:r>
             <a:endParaRPr/>
           </a:p>
@@ -7006,7 +7014,7 @@
             </a:pPr>
             <a:r>
               <a:rPr lang="en" sz="1600"/>
-              <a:t>Alap backend összeállítás elkészült a szükséges dependencykkel</a:t>
+              <a:t>Alap backend összeállítás elkészült a szükséges követelményekkel</a:t>
             </a:r>
             <a:endParaRPr sz="1600"/>
           </a:p>
@@ -7185,7 +7193,7 @@
             </a:pPr>
             <a:r>
               <a:rPr lang="en" sz="1600"/>
-              <a:t>A backendhez ASP.NET keretrendszert használunk, az adatbázishoz való csatlakozáshoz az Entity Frameworkot használjuk. A backend a fly.io platformra van Docker segítségével deployolva, minden GitHub commit után automatikusan létrejön egy Docker Image, és frissítve van a fly.io deployment.</a:t>
+              <a:t>A backendhez ASP.NET keretrendszert használunk, az adatbázishoz való csatlakozáshoz az Entity Frameworkot használjuk. A backend a fly.io platformra van Docker segítségével deployolva, minden GitHub commit után automatikusan frissítve van.</a:t>
             </a:r>
             <a:endParaRPr sz="1600"/>
           </a:p>
@@ -7241,7 +7249,7 @@
             </a:pPr>
             <a:r>
               <a:rPr lang="en" sz="1600"/>
-              <a:t>A frontendhez React keretrendszert használunk és Vite fejlesztői környezetet. A routinghoz React Routert használunk, a komponensekhez Radix UI-t és a stílusokhoz Tailwind CSS-t. A frontend Cloudflare Pages szolgáltatásra van deployolva, minden GitHub commit után automatikusan frissítve van.</a:t>
+              <a:t>A frontendhez React keretrendszert használunk és Vite fejlesztői környezetet. A routinghoz React Routert használunk, a komponensekhez Radix UI-t és a stílusokhoz Tailwind CSS-t. A frontend Cloudflare Pages szolgáltatásra van deployolva.</a:t>
             </a:r>
             <a:endParaRPr sz="1600"/>
           </a:p>

</xml_diff>